<commit_message>
Decided on Project Storm as the name for these efforts on ABmt/ABrtos.  Added a pic to the powerpoint slide that I'll morph into an icon/logo of some sort.
Also, stessed the name space handling a bit with 192 tasks being indexed and included (96 pairs of blinky/printy).  It compiled and flashed w/o issue (https://i.imgur.com/72UhuDY.png & https://i.imgur.com/wk9xTfZ.png).

192 tasks, each with 3 helper functions and 3 helper subs (plus the main loop) nets close to 1350 subs/functions, with the main app and it’s #includes.

The jumping around I am dong in half of the tasks was to ensure that labels were being dealt with correctly – it seems they are.

That means my preprocessing math and regex is good (well, until someone besides me gets starts to write tasks for it.  Lol.).

In seriousness, I actually keep task construct requirements pretty benign such that any user should be able to adopt existing code with very little drama/fanfare.

Next is the task control and context switching…
</commit_message>
<xml_diff>
--- a/ABmt/zOther ABmt_Stuffs/ABmt & ABrtos.pptx
+++ b/ABmt/zOther ABmt_Stuffs/ABmt & ABrtos.pptx
@@ -259,7 +259,7 @@
           <a:p>
             <a:fld id="{E659C033-4BD9-465F-B9FC-B4D539AA1FB3}" type="datetimeFigureOut">
               <a:rPr lang="en-US" smtClean="0"/>
-              <a:t>24Nov18</a:t>
+              <a:t>10Dec18</a:t>
             </a:fld>
             <a:endParaRPr lang="en-US"/>
           </a:p>
@@ -457,7 +457,7 @@
           <a:p>
             <a:fld id="{E659C033-4BD9-465F-B9FC-B4D539AA1FB3}" type="datetimeFigureOut">
               <a:rPr lang="en-US" smtClean="0"/>
-              <a:t>24Nov18</a:t>
+              <a:t>10Dec18</a:t>
             </a:fld>
             <a:endParaRPr lang="en-US"/>
           </a:p>
@@ -665,7 +665,7 @@
           <a:p>
             <a:fld id="{E659C033-4BD9-465F-B9FC-B4D539AA1FB3}" type="datetimeFigureOut">
               <a:rPr lang="en-US" smtClean="0"/>
-              <a:t>24Nov18</a:t>
+              <a:t>10Dec18</a:t>
             </a:fld>
             <a:endParaRPr lang="en-US"/>
           </a:p>
@@ -863,7 +863,7 @@
           <a:p>
             <a:fld id="{E659C033-4BD9-465F-B9FC-B4D539AA1FB3}" type="datetimeFigureOut">
               <a:rPr lang="en-US" smtClean="0"/>
-              <a:t>24Nov18</a:t>
+              <a:t>10Dec18</a:t>
             </a:fld>
             <a:endParaRPr lang="en-US"/>
           </a:p>
@@ -1138,7 +1138,7 @@
           <a:p>
             <a:fld id="{E659C033-4BD9-465F-B9FC-B4D539AA1FB3}" type="datetimeFigureOut">
               <a:rPr lang="en-US" smtClean="0"/>
-              <a:t>24Nov18</a:t>
+              <a:t>10Dec18</a:t>
             </a:fld>
             <a:endParaRPr lang="en-US"/>
           </a:p>
@@ -1403,7 +1403,7 @@
           <a:p>
             <a:fld id="{E659C033-4BD9-465F-B9FC-B4D539AA1FB3}" type="datetimeFigureOut">
               <a:rPr lang="en-US" smtClean="0"/>
-              <a:t>24Nov18</a:t>
+              <a:t>10Dec18</a:t>
             </a:fld>
             <a:endParaRPr lang="en-US"/>
           </a:p>
@@ -1815,7 +1815,7 @@
           <a:p>
             <a:fld id="{E659C033-4BD9-465F-B9FC-B4D539AA1FB3}" type="datetimeFigureOut">
               <a:rPr lang="en-US" smtClean="0"/>
-              <a:t>24Nov18</a:t>
+              <a:t>10Dec18</a:t>
             </a:fld>
             <a:endParaRPr lang="en-US"/>
           </a:p>
@@ -1956,7 +1956,7 @@
           <a:p>
             <a:fld id="{E659C033-4BD9-465F-B9FC-B4D539AA1FB3}" type="datetimeFigureOut">
               <a:rPr lang="en-US" smtClean="0"/>
-              <a:t>24Nov18</a:t>
+              <a:t>10Dec18</a:t>
             </a:fld>
             <a:endParaRPr lang="en-US"/>
           </a:p>
@@ -2069,7 +2069,7 @@
           <a:p>
             <a:fld id="{E659C033-4BD9-465F-B9FC-B4D539AA1FB3}" type="datetimeFigureOut">
               <a:rPr lang="en-US" smtClean="0"/>
-              <a:t>24Nov18</a:t>
+              <a:t>10Dec18</a:t>
             </a:fld>
             <a:endParaRPr lang="en-US"/>
           </a:p>
@@ -2380,7 +2380,7 @@
           <a:p>
             <a:fld id="{E659C033-4BD9-465F-B9FC-B4D539AA1FB3}" type="datetimeFigureOut">
               <a:rPr lang="en-US" smtClean="0"/>
-              <a:t>24Nov18</a:t>
+              <a:t>10Dec18</a:t>
             </a:fld>
             <a:endParaRPr lang="en-US"/>
           </a:p>
@@ -2668,7 +2668,7 @@
           <a:p>
             <a:fld id="{E659C033-4BD9-465F-B9FC-B4D539AA1FB3}" type="datetimeFigureOut">
               <a:rPr lang="en-US" smtClean="0"/>
-              <a:t>24Nov18</a:t>
+              <a:t>10Dec18</a:t>
             </a:fld>
             <a:endParaRPr lang="en-US"/>
           </a:p>
@@ -2909,7 +2909,7 @@
           <a:p>
             <a:fld id="{E659C033-4BD9-465F-B9FC-B4D539AA1FB3}" type="datetimeFigureOut">
               <a:rPr lang="en-US" smtClean="0"/>
-              <a:t>24Nov18</a:t>
+              <a:t>10Dec18</a:t>
             </a:fld>
             <a:endParaRPr lang="en-US"/>
           </a:p>
@@ -6504,6 +6504,42 @@
           </p:txBody>
         </p:sp>
       </p:grpSp>
+      <p:pic>
+        <p:nvPicPr>
+          <p:cNvPr id="4" name="Picture 3" descr="A picture containing nature&#10;&#10;Description automatically generated">
+            <a:extLst>
+              <a:ext uri="{FF2B5EF4-FFF2-40B4-BE49-F238E27FC236}">
+                <a16:creationId xmlns:a16="http://schemas.microsoft.com/office/drawing/2014/main" id="{A1B9F442-C072-4CC7-AD86-5C4E0EEC6F40}"/>
+              </a:ext>
+            </a:extLst>
+          </p:cNvPr>
+          <p:cNvPicPr>
+            <a:picLocks noChangeAspect="1"/>
+          </p:cNvPicPr>
+          <p:nvPr/>
+        </p:nvPicPr>
+        <p:blipFill>
+          <a:blip r:embed="rId5">
+            <a:extLst>
+              <a:ext uri="{28A0092B-C50C-407E-A947-70E740481C1C}">
+                <a14:useLocalDpi xmlns:a14="http://schemas.microsoft.com/office/drawing/2010/main" val="0"/>
+              </a:ext>
+            </a:extLst>
+          </a:blip>
+          <a:stretch>
+            <a:fillRect/>
+          </a:stretch>
+        </p:blipFill>
+        <p:spPr>
+          <a:xfrm>
+            <a:off x="4932128" y="253175"/>
+            <a:ext cx="6924272" cy="4947392"/>
+          </a:xfrm>
+          <a:prstGeom prst="rect">
+            <a:avLst/>
+          </a:prstGeom>
+        </p:spPr>
+      </p:pic>
     </p:spTree>
     <p:extLst>
       <p:ext uri="{BB962C8B-B14F-4D97-AF65-F5344CB8AC3E}">

</xml_diff>